<commit_message>
I'm so done creating these stupid fractals
</commit_message>
<xml_diff>
--- a/fractal_playground.pptx
+++ b/fractal_playground.pptx
@@ -7,6 +7,7 @@
   <p:sldIdLst>
     <p:sldId id="256" r:id="rId2"/>
     <p:sldId id="257" r:id="rId3"/>
+    <p:sldId id="258" r:id="rId4"/>
   </p:sldIdLst>
   <p:sldSz cx="12192000" cy="6858000"/>
   <p:notesSz cx="6858000" cy="9144000"/>
@@ -3263,7 +3264,7 @@
             <a:extLst>
               <a:ext uri="{BEBA8EAE-BF5A-486C-A8C5-ECC9F3942E4B}">
                 <a14:imgProps xmlns:a14="http://schemas.microsoft.com/office/drawing/2010/main">
-                  <a14:imgLayer r:embed="rId8">
+                  <a14:imgLayer r:embed="rId7">
                     <a14:imgEffect>
                       <a14:backgroundRemoval t="0" b="83019" l="0" r="96364">
                         <a14:foregroundMark x1="80000" y1="71698" x2="41818" y2="56604"/>
@@ -3320,7 +3321,7 @@
             <a:extLst>
               <a:ext uri="{BEBA8EAE-BF5A-486C-A8C5-ECC9F3942E4B}">
                 <a14:imgProps xmlns:a14="http://schemas.microsoft.com/office/drawing/2010/main">
-                  <a14:imgLayer r:embed="rId9">
+                  <a14:imgLayer r:embed="rId8">
                     <a14:imgEffect>
                       <a14:backgroundRemoval t="0" b="83019" l="0" r="96364">
                         <a14:foregroundMark x1="80000" y1="71698" x2="41818" y2="56604"/>
@@ -3377,7 +3378,7 @@
             <a:extLst>
               <a:ext uri="{BEBA8EAE-BF5A-486C-A8C5-ECC9F3942E4B}">
                 <a14:imgProps xmlns:a14="http://schemas.microsoft.com/office/drawing/2010/main">
-                  <a14:imgLayer r:embed="rId10">
+                  <a14:imgLayer r:embed="rId9">
                     <a14:imgEffect>
                       <a14:backgroundRemoval t="0" b="83019" l="0" r="96364">
                         <a14:foregroundMark x1="80000" y1="71698" x2="41818" y2="56604"/>
@@ -3434,7 +3435,7 @@
             <a:extLst>
               <a:ext uri="{BEBA8EAE-BF5A-486C-A8C5-ECC9F3942E4B}">
                 <a14:imgProps xmlns:a14="http://schemas.microsoft.com/office/drawing/2010/main">
-                  <a14:imgLayer r:embed="rId11">
+                  <a14:imgLayer r:embed="rId10">
                     <a14:imgEffect>
                       <a14:backgroundRemoval t="0" b="83019" l="0" r="96364">
                         <a14:foregroundMark x1="80000" y1="71698" x2="41818" y2="56604"/>
@@ -3487,11 +3488,11 @@
           <p:nvPr/>
         </p:nvPicPr>
         <p:blipFill>
-          <a:blip r:embed="rId12">
+          <a:blip r:embed="rId11">
             <a:extLst>
               <a:ext uri="{BEBA8EAE-BF5A-486C-A8C5-ECC9F3942E4B}">
                 <a14:imgProps xmlns:a14="http://schemas.microsoft.com/office/drawing/2010/main">
-                  <a14:imgLayer r:embed="rId13">
+                  <a14:imgLayer r:embed="rId12">
                     <a14:imgEffect>
                       <a14:backgroundRemoval t="10000" b="90000" l="10000" r="90000"/>
                     </a14:imgEffect>
@@ -3530,7 +3531,7 @@
             <a:extLst>
               <a:ext uri="{BEBA8EAE-BF5A-486C-A8C5-ECC9F3942E4B}">
                 <a14:imgProps xmlns:a14="http://schemas.microsoft.com/office/drawing/2010/main">
-                  <a14:imgLayer r:embed="rId14">
+                  <a14:imgLayer r:embed="rId10">
                     <a14:imgEffect>
                       <a14:backgroundRemoval t="0" b="83019" l="0" r="96364">
                         <a14:foregroundMark x1="80000" y1="71698" x2="41818" y2="56604"/>
@@ -3827,7 +3828,7 @@
             <a:extLst>
               <a:ext uri="{BEBA8EAE-BF5A-486C-A8C5-ECC9F3942E4B}">
                 <a14:imgProps xmlns:a14="http://schemas.microsoft.com/office/drawing/2010/main">
-                  <a14:imgLayer r:embed="rId5">
+                  <a14:imgLayer r:embed="rId7">
                     <a14:imgEffect>
                       <a14:backgroundRemoval t="0" b="83019" l="0" r="96364">
                         <a14:foregroundMark x1="80000" y1="71698" x2="41818" y2="56604"/>
@@ -3875,6 +3876,117 @@
     <p:extLst>
       <p:ext uri="{BB962C8B-B14F-4D97-AF65-F5344CB8AC3E}">
         <p14:creationId xmlns:p14="http://schemas.microsoft.com/office/powerpoint/2010/main" val="1718166724"/>
+      </p:ext>
+    </p:extLst>
+  </p:cSld>
+  <p:clrMapOvr>
+    <a:masterClrMapping/>
+  </p:clrMapOvr>
+</p:sld>
+</file>
+
+<file path=ppt/slides/slide3.xml><?xml version="1.0" encoding="utf-8"?>
+<p:sld xmlns:a="http://schemas.openxmlformats.org/drawingml/2006/main" xmlns:r="http://schemas.openxmlformats.org/officeDocument/2006/relationships" xmlns:p="http://schemas.openxmlformats.org/presentationml/2006/main">
+  <p:cSld>
+    <p:spTree>
+      <p:nvGrpSpPr>
+        <p:cNvPr id="1" name=""/>
+        <p:cNvGrpSpPr/>
+        <p:nvPr/>
+      </p:nvGrpSpPr>
+      <p:grpSpPr>
+        <a:xfrm>
+          <a:off x="0" y="0"/>
+          <a:ext cx="0" cy="0"/>
+          <a:chOff x="0" y="0"/>
+          <a:chExt cx="0" cy="0"/>
+        </a:xfrm>
+      </p:grpSpPr>
+      <p:pic>
+        <p:nvPicPr>
+          <p:cNvPr id="4" name="Picture 3"/>
+          <p:cNvPicPr>
+            <a:picLocks noChangeAspect="1"/>
+          </p:cNvPicPr>
+          <p:nvPr/>
+        </p:nvPicPr>
+        <p:blipFill>
+          <a:blip r:embed="rId2">
+            <a:extLst>
+              <a:ext uri="{28A0092B-C50C-407E-A947-70E740481C1C}">
+                <a14:useLocalDpi xmlns:a14="http://schemas.microsoft.com/office/drawing/2010/main" val="0"/>
+              </a:ext>
+            </a:extLst>
+          </a:blip>
+          <a:stretch>
+            <a:fillRect/>
+          </a:stretch>
+        </p:blipFill>
+        <p:spPr>
+          <a:xfrm>
+            <a:off x="3797300" y="1092200"/>
+            <a:ext cx="4584700" cy="4660900"/>
+          </a:xfrm>
+          <a:prstGeom prst="rect">
+            <a:avLst/>
+          </a:prstGeom>
+        </p:spPr>
+      </p:pic>
+      <p:pic>
+        <p:nvPicPr>
+          <p:cNvPr id="5" name="Picture 4"/>
+          <p:cNvPicPr>
+            <a:picLocks noChangeAspect="1"/>
+          </p:cNvPicPr>
+          <p:nvPr/>
+        </p:nvPicPr>
+        <p:blipFill>
+          <a:blip r:embed="rId3">
+            <a:extLst>
+              <a:ext uri="{BEBA8EAE-BF5A-486C-A8C5-ECC9F3942E4B}">
+                <a14:imgProps xmlns:a14="http://schemas.microsoft.com/office/drawing/2010/main">
+                  <a14:imgLayer r:embed="rId4">
+                    <a14:imgEffect>
+                      <a14:backgroundRemoval t="10000" b="90000" l="10000" r="90000">
+                        <a14:foregroundMark x1="23636" y1="25707" x2="41558" y2="35219"/>
+                        <a14:foregroundMark x1="23896" y1="26735" x2="35844" y2="42416"/>
+                        <a14:foregroundMark x1="35325" y1="42931" x2="36364" y2="47301"/>
+                        <a14:foregroundMark x1="31169" y1="65810" x2="37922" y2="58869"/>
+                        <a14:foregroundMark x1="50649" y1="31105" x2="39221" y2="15167"/>
+                        <a14:foregroundMark x1="62338" y1="37532" x2="58961" y2="35733"/>
+                        <a14:foregroundMark x1="54286" y1="52442" x2="56883" y2="50386"/>
+                        <a14:backgroundMark x1="37143" y1="61440" x2="37403" y2="60154"/>
+                      </a14:backgroundRemoval>
+                    </a14:imgEffect>
+                    <a14:imgEffect>
+                      <a14:colorTemperature colorTemp="4700"/>
+                    </a14:imgEffect>
+                  </a14:imgLayer>
+                </a14:imgProps>
+              </a:ext>
+              <a:ext uri="{28A0092B-C50C-407E-A947-70E740481C1C}">
+                <a14:useLocalDpi xmlns:a14="http://schemas.microsoft.com/office/drawing/2010/main" val="0"/>
+              </a:ext>
+            </a:extLst>
+          </a:blip>
+          <a:stretch>
+            <a:fillRect/>
+          </a:stretch>
+        </p:blipFill>
+        <p:spPr>
+          <a:xfrm rot="9754760">
+            <a:off x="4235498" y="1676473"/>
+            <a:ext cx="2924732" cy="2955120"/>
+          </a:xfrm>
+          <a:prstGeom prst="rect">
+            <a:avLst/>
+          </a:prstGeom>
+        </p:spPr>
+      </p:pic>
+    </p:spTree>
+    <p:extLst>
+      <p:ext uri="{BB962C8B-B14F-4D97-AF65-F5344CB8AC3E}">
+        <p14:creationId xmlns:p14="http://schemas.microsoft.com/office/powerpoint/2010/main" val="716808726"/>
       </p:ext>
     </p:extLst>
   </p:cSld>

</xml_diff>